<commit_message>
First draft of completed PP
</commit_message>
<xml_diff>
--- a/Presentation .pptx
+++ b/Presentation .pptx
@@ -5,10 +5,10 @@
     <p:sldMasterId id="2147483672" r:id="rId4"/>
   </p:sldMasterIdLst>
   <p:notesMasterIdLst>
-    <p:notesMasterId r:id="rId12"/>
+    <p:notesMasterId r:id="rId13"/>
   </p:notesMasterIdLst>
   <p:handoutMasterIdLst>
-    <p:handoutMasterId r:id="rId13"/>
+    <p:handoutMasterId r:id="rId14"/>
   </p:handoutMasterIdLst>
   <p:sldIdLst>
     <p:sldId id="256" r:id="rId5"/>
@@ -17,7 +17,8 @@
     <p:sldId id="259" r:id="rId8"/>
     <p:sldId id="261" r:id="rId9"/>
     <p:sldId id="264" r:id="rId10"/>
-    <p:sldId id="260" r:id="rId11"/>
+    <p:sldId id="265" r:id="rId11"/>
+    <p:sldId id="260" r:id="rId12"/>
   </p:sldIdLst>
   <p:sldSz cx="12192000" cy="6858000"/>
   <p:notesSz cx="6858000" cy="9144000"/>
@@ -18773,6 +18774,177 @@
           <a:bodyPr/>
           <a:lstStyle/>
           <a:p>
+            <a:r>
+              <a:rPr lang="en-US" dirty="0"/>
+              <a:t>In the future, blockchain-based KYC utilities will help bring cost savings to any industry that relies on identity verification. This is because the technology will allow banks and other financial organizations to rely on a more secure organized unified model of data handling.</a:t>
+            </a:r>
+          </a:p>
+        </p:txBody>
+      </p:sp>
+      <p:sp>
+        <p:nvSpPr>
+          <p:cNvPr id="4" name="Slide Number Placeholder 3"/>
+          <p:cNvSpPr>
+            <a:spLocks noGrp="1"/>
+          </p:cNvSpPr>
+          <p:nvPr>
+            <p:ph type="sldNum" sz="quarter" idx="5"/>
+          </p:nvPr>
+        </p:nvSpPr>
+        <p:spPr/>
+        <p:txBody>
+          <a:bodyPr/>
+          <a:lstStyle/>
+          <a:p>
+            <a:fld id="{C6B3AB32-59DF-41F1-9618-EDFBF5049629}" type="slidenum">
+              <a:rPr lang="en-US" smtClean="0"/>
+              <a:t>7</a:t>
+            </a:fld>
+            <a:endParaRPr lang="en-US" dirty="0"/>
+          </a:p>
+        </p:txBody>
+      </p:sp>
+    </p:spTree>
+    <p:extLst>
+      <p:ext uri="{BB962C8B-B14F-4D97-AF65-F5344CB8AC3E}">
+        <p14:creationId xmlns:p14="http://schemas.microsoft.com/office/powerpoint/2010/main" val="1931859891"/>
+      </p:ext>
+    </p:extLst>
+  </p:cSld>
+  <p:clrMapOvr>
+    <a:masterClrMapping/>
+  </p:clrMapOvr>
+</p:notes>
+</file>
+
+<file path=ppt/notesSlides/notesSlide8.xml><?xml version="1.0" encoding="utf-8"?>
+<p:notes xmlns:a="http://schemas.openxmlformats.org/drawingml/2006/main" xmlns:r="http://schemas.openxmlformats.org/officeDocument/2006/relationships" xmlns:p="http://schemas.openxmlformats.org/presentationml/2006/main">
+  <p:cSld>
+    <p:spTree>
+      <p:nvGrpSpPr>
+        <p:cNvPr id="1" name=""/>
+        <p:cNvGrpSpPr/>
+        <p:nvPr/>
+      </p:nvGrpSpPr>
+      <p:grpSpPr>
+        <a:xfrm>
+          <a:off x="0" y="0"/>
+          <a:ext cx="0" cy="0"/>
+          <a:chOff x="0" y="0"/>
+          <a:chExt cx="0" cy="0"/>
+        </a:xfrm>
+      </p:grpSpPr>
+      <p:sp>
+        <p:nvSpPr>
+          <p:cNvPr id="2" name="Slide Image Placeholder 1"/>
+          <p:cNvSpPr>
+            <a:spLocks noGrp="1" noRot="1" noChangeAspect="1"/>
+          </p:cNvSpPr>
+          <p:nvPr>
+            <p:ph type="sldImg"/>
+          </p:nvPr>
+        </p:nvSpPr>
+        <p:spPr/>
+      </p:sp>
+      <p:sp>
+        <p:nvSpPr>
+          <p:cNvPr id="3" name="Notes Placeholder 2"/>
+          <p:cNvSpPr>
+            <a:spLocks noGrp="1"/>
+          </p:cNvSpPr>
+          <p:nvPr>
+            <p:ph type="body" idx="1"/>
+          </p:nvPr>
+        </p:nvSpPr>
+        <p:spPr/>
+        <p:txBody>
+          <a:bodyPr/>
+          <a:lstStyle/>
+          <a:p>
+            <a:pPr rtl="0"/>
+            <a:r>
+              <a:rPr lang="en-CA" sz="1200" b="0" i="0" u="none" strike="noStrike" kern="1200" dirty="0">
+                <a:solidFill>
+                  <a:schemeClr val="tx1"/>
+                </a:solidFill>
+                <a:effectLst/>
+                <a:latin typeface="+mn-lt"/>
+                <a:ea typeface="+mn-ea"/>
+                <a:cs typeface="+mn-cs"/>
+              </a:rPr>
+              <a:t>Jessica Carmichael</a:t>
+            </a:r>
+            <a:endParaRPr lang="en-CA" b="0" dirty="0">
+              <a:effectLst/>
+            </a:endParaRPr>
+          </a:p>
+          <a:p>
+            <a:pPr rtl="0"/>
+            <a:r>
+              <a:rPr lang="en-CA" sz="1200" b="0" i="0" u="none" strike="noStrike" kern="1200" dirty="0">
+                <a:solidFill>
+                  <a:schemeClr val="tx1"/>
+                </a:solidFill>
+                <a:effectLst/>
+                <a:latin typeface="+mn-lt"/>
+                <a:ea typeface="+mn-ea"/>
+                <a:cs typeface="+mn-cs"/>
+              </a:rPr>
+              <a:t>Elizabeth Morris</a:t>
+            </a:r>
+            <a:endParaRPr lang="en-CA" b="0" dirty="0">
+              <a:effectLst/>
+            </a:endParaRPr>
+          </a:p>
+          <a:p>
+            <a:pPr rtl="0"/>
+            <a:r>
+              <a:rPr lang="en-CA" sz="1200" b="0" i="0" u="none" strike="noStrike" kern="1200" dirty="0">
+                <a:solidFill>
+                  <a:schemeClr val="tx1"/>
+                </a:solidFill>
+                <a:effectLst/>
+                <a:latin typeface="+mn-lt"/>
+                <a:ea typeface="+mn-ea"/>
+                <a:cs typeface="+mn-cs"/>
+              </a:rPr>
+              <a:t>Daniel Lynes</a:t>
+            </a:r>
+            <a:endParaRPr lang="en-CA" b="0" dirty="0">
+              <a:effectLst/>
+            </a:endParaRPr>
+          </a:p>
+          <a:p>
+            <a:pPr rtl="0"/>
+            <a:r>
+              <a:rPr lang="en-CA" sz="1200" b="0" i="0" u="none" strike="noStrike" kern="1200" dirty="0" err="1">
+                <a:solidFill>
+                  <a:schemeClr val="tx1"/>
+                </a:solidFill>
+                <a:effectLst/>
+                <a:latin typeface="+mn-lt"/>
+                <a:ea typeface="+mn-ea"/>
+                <a:cs typeface="+mn-cs"/>
+              </a:rPr>
+              <a:t>Manjari</a:t>
+            </a:r>
+            <a:r>
+              <a:rPr lang="en-CA" sz="1200" b="0" i="0" u="none" strike="noStrike" kern="1200" dirty="0">
+                <a:solidFill>
+                  <a:schemeClr val="tx1"/>
+                </a:solidFill>
+                <a:effectLst/>
+                <a:latin typeface="+mn-lt"/>
+                <a:ea typeface="+mn-ea"/>
+                <a:cs typeface="+mn-cs"/>
+              </a:rPr>
+              <a:t> Shukla</a:t>
+            </a:r>
+            <a:endParaRPr lang="en-CA" b="0" dirty="0">
+              <a:effectLst/>
+            </a:endParaRPr>
+          </a:p>
+          <a:p>
             <a:endParaRPr lang="en-US" dirty="0"/>
           </a:p>
         </p:txBody>
@@ -18794,7 +18966,7 @@
           <a:p>
             <a:fld id="{C6B3AB32-59DF-41F1-9618-EDFBF5049629}" type="slidenum">
               <a:rPr lang="en-US" smtClean="0"/>
-              <a:t>7</a:t>
+              <a:t>8</a:t>
             </a:fld>
             <a:endParaRPr lang="en-US" dirty="0"/>
           </a:p>
@@ -25318,6 +25490,294 @@
       </p:grpSpPr>
       <p:sp useBgFill="1">
         <p:nvSpPr>
+          <p:cNvPr id="144" name="Rectangle 143">
+            <a:extLst>
+              <a:ext uri="{FF2B5EF4-FFF2-40B4-BE49-F238E27FC236}">
+                <a16:creationId xmlns:a16="http://schemas.microsoft.com/office/drawing/2014/main" id="{8F404549-B4DC-481C-926C-DED3EF1C585B}"/>
+              </a:ext>
+              <a:ext uri="{C183D7F6-B498-43B3-948B-1728B52AA6E4}">
+                <adec:decorative xmlns:adec="http://schemas.microsoft.com/office/drawing/2017/decorative" val="1"/>
+              </a:ext>
+            </a:extLst>
+          </p:cNvPr>
+          <p:cNvSpPr>
+            <a:spLocks noGrp="1" noRot="1" noChangeAspect="1" noMove="1" noResize="1" noEditPoints="1" noAdjustHandles="1" noChangeArrowheads="1" noChangeShapeType="1" noTextEdit="1"/>
+          </p:cNvSpPr>
+          <p:nvPr>
+            <p:extLst>
+              <p:ext uri="{386F3935-93C4-4BCD-93E2-E3B085C9AB24}">
+                <p16:designElem xmlns:p16="http://schemas.microsoft.com/office/powerpoint/2015/main" val="1"/>
+              </p:ext>
+            </p:extLst>
+          </p:nvPr>
+        </p:nvSpPr>
+        <p:spPr>
+          <a:xfrm>
+            <a:off x="0" y="614406"/>
+            <a:ext cx="12192000" cy="6243593"/>
+          </a:xfrm>
+          <a:prstGeom prst="rect">
+            <a:avLst/>
+          </a:prstGeom>
+          <a:ln>
+            <a:noFill/>
+          </a:ln>
+        </p:spPr>
+        <p:style>
+          <a:lnRef idx="2">
+            <a:schemeClr val="accent1">
+              <a:shade val="50000"/>
+            </a:schemeClr>
+          </a:lnRef>
+          <a:fillRef idx="1">
+            <a:schemeClr val="accent1"/>
+          </a:fillRef>
+          <a:effectRef idx="0">
+            <a:schemeClr val="accent1"/>
+          </a:effectRef>
+          <a:fontRef idx="minor">
+            <a:schemeClr val="lt1"/>
+          </a:fontRef>
+        </p:style>
+        <p:txBody>
+          <a:bodyPr rtlCol="0" anchor="ctr"/>
+          <a:lstStyle/>
+          <a:p>
+            <a:pPr algn="ctr"/>
+            <a:endParaRPr lang="en-US"/>
+          </a:p>
+        </p:txBody>
+      </p:sp>
+      <p:sp>
+        <p:nvSpPr>
+          <p:cNvPr id="146" name="Rectangle 145">
+            <a:extLst>
+              <a:ext uri="{FF2B5EF4-FFF2-40B4-BE49-F238E27FC236}">
+                <a16:creationId xmlns:a16="http://schemas.microsoft.com/office/drawing/2014/main" id="{1E8FD5CD-351E-4B06-8B78-BD5102D00908}"/>
+              </a:ext>
+              <a:ext uri="{C183D7F6-B498-43B3-948B-1728B52AA6E4}">
+                <adec:decorative xmlns:adec="http://schemas.microsoft.com/office/drawing/2017/decorative" val="1"/>
+              </a:ext>
+            </a:extLst>
+          </p:cNvPr>
+          <p:cNvSpPr>
+            <a:spLocks noGrp="1" noRot="1" noChangeAspect="1" noMove="1" noResize="1" noEditPoints="1" noAdjustHandles="1" noChangeArrowheads="1" noChangeShapeType="1" noTextEdit="1"/>
+          </p:cNvSpPr>
+          <p:nvPr>
+            <p:extLst>
+              <p:ext uri="{386F3935-93C4-4BCD-93E2-E3B085C9AB24}">
+                <p16:designElem xmlns:p16="http://schemas.microsoft.com/office/powerpoint/2015/main" val="1"/>
+              </p:ext>
+            </p:extLst>
+          </p:nvPr>
+        </p:nvSpPr>
+        <p:spPr>
+          <a:xfrm>
+            <a:off x="442377" y="614407"/>
+            <a:ext cx="3707477" cy="5611772"/>
+          </a:xfrm>
+          <a:prstGeom prst="rect">
+            <a:avLst/>
+          </a:prstGeom>
+          <a:solidFill>
+            <a:schemeClr val="accent1"/>
+          </a:solidFill>
+          <a:ln>
+            <a:noFill/>
+          </a:ln>
+          <a:effectLst/>
+        </p:spPr>
+        <p:style>
+          <a:lnRef idx="1">
+            <a:schemeClr val="accent1"/>
+          </a:lnRef>
+          <a:fillRef idx="3">
+            <a:schemeClr val="accent1"/>
+          </a:fillRef>
+          <a:effectRef idx="2">
+            <a:schemeClr val="accent1"/>
+          </a:effectRef>
+          <a:fontRef idx="minor">
+            <a:schemeClr val="lt1"/>
+          </a:fontRef>
+        </p:style>
+      </p:sp>
+      <p:sp>
+        <p:nvSpPr>
+          <p:cNvPr id="2" name="Title 1">
+            <a:extLst>
+              <a:ext uri="{FF2B5EF4-FFF2-40B4-BE49-F238E27FC236}">
+                <a16:creationId xmlns:a16="http://schemas.microsoft.com/office/drawing/2014/main" id="{2894C1AC-D1A6-9A4E-9334-D425FB5552F0}"/>
+              </a:ext>
+            </a:extLst>
+          </p:cNvPr>
+          <p:cNvSpPr>
+            <a:spLocks noGrp="1"/>
+          </p:cNvSpPr>
+          <p:nvPr>
+            <p:ph type="title"/>
+          </p:nvPr>
+        </p:nvSpPr>
+        <p:spPr>
+          <a:xfrm>
+            <a:off x="601255" y="702156"/>
+            <a:ext cx="3409783" cy="1013800"/>
+          </a:xfrm>
+        </p:spPr>
+        <p:txBody>
+          <a:bodyPr vert="horz" lIns="91440" tIns="45720" rIns="91440" bIns="45720" rtlCol="0">
+            <a:normAutofit/>
+          </a:bodyPr>
+          <a:lstStyle/>
+          <a:p>
+            <a:r>
+              <a:rPr lang="en-US" dirty="0"/>
+              <a:t>Conclusion </a:t>
+            </a:r>
+          </a:p>
+        </p:txBody>
+      </p:sp>
+      <p:sp>
+        <p:nvSpPr>
+          <p:cNvPr id="5133" name="Content Placeholder 5132">
+            <a:extLst>
+              <a:ext uri="{FF2B5EF4-FFF2-40B4-BE49-F238E27FC236}">
+                <a16:creationId xmlns:a16="http://schemas.microsoft.com/office/drawing/2014/main" id="{7D1129CC-823F-4BA9-B743-5F877CE841EC}"/>
+              </a:ext>
+            </a:extLst>
+          </p:cNvPr>
+          <p:cNvSpPr>
+            <a:spLocks noGrp="1"/>
+          </p:cNvSpPr>
+          <p:nvPr>
+            <p:ph idx="1"/>
+          </p:nvPr>
+        </p:nvSpPr>
+        <p:spPr>
+          <a:xfrm>
+            <a:off x="601255" y="1964168"/>
+            <a:ext cx="3409782" cy="4036582"/>
+          </a:xfrm>
+        </p:spPr>
+        <p:txBody>
+          <a:bodyPr>
+            <a:normAutofit/>
+          </a:bodyPr>
+          <a:lstStyle/>
+          <a:p>
+            <a:r>
+              <a:rPr lang="en-US" dirty="0">
+                <a:solidFill>
+                  <a:schemeClr val="bg1"/>
+                </a:solidFill>
+              </a:rPr>
+              <a:t>Blockchain based KYC systems will significantly reduce compliance costs</a:t>
+            </a:r>
+          </a:p>
+          <a:p>
+            <a:r>
+              <a:rPr lang="en-US" dirty="0">
+                <a:solidFill>
+                  <a:schemeClr val="bg1"/>
+                </a:solidFill>
+              </a:rPr>
+              <a:t>This technology will allow banks and other financial organizations to rely on a more secure and unified model of data handling </a:t>
+            </a:r>
+          </a:p>
+          <a:p>
+            <a:endParaRPr lang="en-US" dirty="0">
+              <a:solidFill>
+                <a:schemeClr val="bg1"/>
+              </a:solidFill>
+            </a:endParaRPr>
+          </a:p>
+        </p:txBody>
+      </p:sp>
+      <p:pic>
+        <p:nvPicPr>
+          <p:cNvPr id="5122" name="Picture 2" descr="Diagram&#10;&#10;Description automatically generated">
+            <a:extLst>
+              <a:ext uri="{FF2B5EF4-FFF2-40B4-BE49-F238E27FC236}">
+                <a16:creationId xmlns:a16="http://schemas.microsoft.com/office/drawing/2014/main" id="{8E778282-99B6-DC46-8556-7AD91DB76E72}"/>
+              </a:ext>
+            </a:extLst>
+          </p:cNvPr>
+          <p:cNvPicPr>
+            <a:picLocks noChangeAspect="1" noChangeArrowheads="1"/>
+          </p:cNvPicPr>
+          <p:nvPr/>
+        </p:nvPicPr>
+        <p:blipFill rotWithShape="1">
+          <a:blip r:embed="rId3">
+            <a:extLst>
+              <a:ext uri="{28A0092B-C50C-407E-A947-70E740481C1C}">
+                <a14:useLocalDpi xmlns:a14="http://schemas.microsoft.com/office/drawing/2010/main" val="0"/>
+              </a:ext>
+            </a:extLst>
+          </a:blip>
+          <a:srcRect l="8936" r="1506"/>
+          <a:stretch/>
+        </p:blipFill>
+        <p:spPr bwMode="auto">
+          <a:xfrm>
+            <a:off x="4961774" y="1111641"/>
+            <a:ext cx="6149315" cy="4655348"/>
+          </a:xfrm>
+          <a:prstGeom prst="rect">
+            <a:avLst/>
+          </a:prstGeom>
+          <a:noFill/>
+          <a:extLst>
+            <a:ext uri="{909E8E84-426E-40DD-AFC4-6F175D3DCCD1}">
+              <a14:hiddenFill xmlns:a14="http://schemas.microsoft.com/office/drawing/2010/main">
+                <a:solidFill>
+                  <a:srgbClr val="FFFFFF"/>
+                </a:solidFill>
+              </a14:hiddenFill>
+            </a:ext>
+          </a:extLst>
+        </p:spPr>
+      </p:pic>
+    </p:spTree>
+    <p:extLst>
+      <p:ext uri="{BB962C8B-B14F-4D97-AF65-F5344CB8AC3E}">
+        <p14:creationId xmlns:p14="http://schemas.microsoft.com/office/powerpoint/2010/main" val="4050793261"/>
+      </p:ext>
+    </p:extLst>
+  </p:cSld>
+  <p:clrMapOvr>
+    <a:masterClrMapping/>
+  </p:clrMapOvr>
+</p:sld>
+</file>
+
+<file path=ppt/slides/slide8.xml><?xml version="1.0" encoding="utf-8"?>
+<p:sld xmlns:a="http://schemas.openxmlformats.org/drawingml/2006/main" xmlns:r="http://schemas.openxmlformats.org/officeDocument/2006/relationships" xmlns:p="http://schemas.openxmlformats.org/presentationml/2006/main">
+  <p:cSld>
+    <p:bg>
+      <p:bgPr>
+        <a:solidFill>
+          <a:schemeClr val="bg1"/>
+        </a:solidFill>
+        <a:effectLst/>
+      </p:bgPr>
+    </p:bg>
+    <p:spTree>
+      <p:nvGrpSpPr>
+        <p:cNvPr id="1" name=""/>
+        <p:cNvGrpSpPr/>
+        <p:nvPr/>
+      </p:nvGrpSpPr>
+      <p:grpSpPr>
+        <a:xfrm>
+          <a:off x="0" y="0"/>
+          <a:ext cx="0" cy="0"/>
+          <a:chOff x="0" y="0"/>
+          <a:chExt cx="0" cy="0"/>
+        </a:xfrm>
+      </p:grpSpPr>
+      <p:sp useBgFill="1">
+        <p:nvSpPr>
           <p:cNvPr id="10" name="Rectangle 9">
             <a:extLst>
               <a:ext uri="{FF2B5EF4-FFF2-40B4-BE49-F238E27FC236}">
@@ -25499,7 +25959,29 @@
                   <a:srgbClr val="FFFFFF"/>
                 </a:solidFill>
               </a:rPr>
-              <a:t>Thank You</a:t>
+              <a:t>Thank You!</a:t>
+            </a:r>
+            <a:br>
+              <a:rPr lang="en-US" dirty="0">
+                <a:solidFill>
+                  <a:srgbClr val="FFFFFF"/>
+                </a:solidFill>
+              </a:rPr>
+            </a:br>
+            <a:br>
+              <a:rPr lang="en-US" dirty="0">
+                <a:solidFill>
+                  <a:srgbClr val="FFFFFF"/>
+                </a:solidFill>
+              </a:rPr>
+            </a:br>
+            <a:r>
+              <a:rPr lang="en-US" dirty="0">
+                <a:solidFill>
+                  <a:srgbClr val="FFFFFF"/>
+                </a:solidFill>
+              </a:rPr>
+              <a:t>Questions?</a:t>
             </a:r>
           </a:p>
         </p:txBody>
@@ -25522,27 +26004,129 @@
         </p:nvSpPr>
         <p:spPr>
           <a:xfrm>
-            <a:off x="8296275" y="3505095"/>
-            <a:ext cx="3081576" cy="2629006"/>
+            <a:off x="8296275" y="4571999"/>
+            <a:ext cx="3081576" cy="1562101"/>
           </a:xfrm>
         </p:spPr>
         <p:txBody>
-          <a:bodyPr>
-            <a:normAutofit/>
+          <a:bodyPr anchor="b">
+            <a:normAutofit fontScale="25000" lnSpcReduction="20000"/>
           </a:bodyPr>
           <a:lstStyle/>
           <a:p>
+            <a:endParaRPr lang="en-US" dirty="0">
+              <a:solidFill>
+                <a:schemeClr val="bg2"/>
+              </a:solidFill>
+            </a:endParaRPr>
+          </a:p>
+          <a:p>
+            <a:pPr algn="r"/>
+            <a:endParaRPr lang="en-US" dirty="0">
+              <a:solidFill>
+                <a:schemeClr val="bg2"/>
+              </a:solidFill>
+            </a:endParaRPr>
+          </a:p>
+          <a:p>
+            <a:endParaRPr lang="en-US" dirty="0">
+              <a:solidFill>
+                <a:schemeClr val="bg2"/>
+              </a:solidFill>
+            </a:endParaRPr>
+          </a:p>
+          <a:p>
+            <a:pPr algn="r"/>
             <a:r>
-              <a:rPr lang="en-US" dirty="0">
+              <a:rPr lang="en-US" sz="4400" dirty="0">
                 <a:solidFill>
                   <a:schemeClr val="bg2"/>
                 </a:solidFill>
               </a:rPr>
-              <a:t>someone@example.com</a:t>
+              <a:t>Jessica Carmichael</a:t>
             </a:r>
           </a:p>
           <a:p>
-            <a:endParaRPr lang="en-US" dirty="0">
+            <a:pPr algn="r"/>
+            <a:r>
+              <a:rPr lang="en-US" sz="4400" dirty="0">
+                <a:solidFill>
+                  <a:schemeClr val="bg2"/>
+                </a:solidFill>
+              </a:rPr>
+              <a:t>Elizabeth </a:t>
+            </a:r>
+            <a:r>
+              <a:rPr lang="en-US" sz="4400" dirty="0" err="1">
+                <a:solidFill>
+                  <a:schemeClr val="bg2"/>
+                </a:solidFill>
+              </a:rPr>
+              <a:t>morris</a:t>
+            </a:r>
+            <a:r>
+              <a:rPr lang="en-US" sz="4400" dirty="0">
+                <a:solidFill>
+                  <a:schemeClr val="bg2"/>
+                </a:solidFill>
+              </a:rPr>
+              <a:t> </a:t>
+            </a:r>
+          </a:p>
+          <a:p>
+            <a:pPr algn="r"/>
+            <a:r>
+              <a:rPr lang="en-US" sz="4400" dirty="0">
+                <a:solidFill>
+                  <a:schemeClr val="bg2"/>
+                </a:solidFill>
+              </a:rPr>
+              <a:t>Daniel </a:t>
+            </a:r>
+            <a:r>
+              <a:rPr lang="en-US" sz="4400" dirty="0" err="1">
+                <a:solidFill>
+                  <a:schemeClr val="bg2"/>
+                </a:solidFill>
+              </a:rPr>
+              <a:t>lynes</a:t>
+            </a:r>
+            <a:r>
+              <a:rPr lang="en-US" sz="4400" dirty="0">
+                <a:solidFill>
+                  <a:schemeClr val="bg2"/>
+                </a:solidFill>
+              </a:rPr>
+              <a:t> </a:t>
+            </a:r>
+          </a:p>
+          <a:p>
+            <a:pPr algn="r"/>
+            <a:r>
+              <a:rPr lang="en-US" sz="4400" dirty="0" err="1">
+                <a:solidFill>
+                  <a:schemeClr val="bg2"/>
+                </a:solidFill>
+              </a:rPr>
+              <a:t>Manjari</a:t>
+            </a:r>
+            <a:r>
+              <a:rPr lang="en-US" sz="4400" dirty="0">
+                <a:solidFill>
+                  <a:schemeClr val="bg2"/>
+                </a:solidFill>
+              </a:rPr>
+              <a:t> </a:t>
+            </a:r>
+            <a:r>
+              <a:rPr lang="en-US" sz="4400" dirty="0" err="1">
+                <a:solidFill>
+                  <a:schemeClr val="bg2"/>
+                </a:solidFill>
+              </a:rPr>
+              <a:t>shukla</a:t>
+            </a:r>
+            <a:endParaRPr lang="en-US" sz="4400" dirty="0">
               <a:solidFill>
                 <a:schemeClr val="bg2"/>
               </a:solidFill>

</xml_diff>